<commit_message>
Minor fixes for "02. Lists" slides
</commit_message>
<xml_diff>
--- a/Courses/Software-Sciences/Module-2-DS-and-Algo-New/02-Lists/02-Lists.pptx
+++ b/Courses/Software-Sciences/Module-2-DS-and-Algo-New/02-Lists/02-Lists.pptx
@@ -139,13 +139,13 @@
   <p:extLst>
     <p:ext uri="{521415D9-36F7-43E2-AB2F-B90AF26B5E84}">
       <p14:sectionLst xmlns:p14="http://schemas.microsoft.com/office/powerpoint/2010/main">
-        <p14:section name="Intro" id="{AD5DFF93-F109-42C1-82DC-F3DC38E201FD}">
+        <p14:section name="Въведение" id="{AD5DFF93-F109-42C1-82DC-F3DC38E201FD}">
           <p14:sldIdLst>
             <p14:sldId id="274"/>
             <p14:sldId id="276"/>
           </p14:sldIdLst>
         </p14:section>
-        <p14:section name="Lists" id="{75255194-587A-4A21-B155-F0650F50C22E}">
+        <p14:section name="Списъци" id="{75255194-587A-4A21-B155-F0650F50C22E}">
           <p14:sldIdLst>
             <p14:sldId id="493"/>
             <p14:sldId id="492"/>
@@ -156,7 +156,7 @@
             <p14:sldId id="494"/>
           </p14:sldIdLst>
         </p14:section>
-        <p14:section name="Reading Lists from the Console" id="{4D341BA8-2906-4632-BBCD-AFE393EE5B9E}">
+        <p14:section name="Четене на листове от конзолата" id="{4D341BA8-2906-4632-BBCD-AFE393EE5B9E}">
           <p14:sldIdLst>
             <p14:sldId id="504"/>
             <p14:sldId id="505"/>
@@ -169,7 +169,7 @@
             <p14:sldId id="524"/>
           </p14:sldIdLst>
         </p14:section>
-        <p14:section name="Sorting Lists and Arrays" id="{76D4156F-3A13-4126-BB8E-5436707FC4AB}">
+        <p14:section name="Сортиране на списъци и масиви" id="{76D4156F-3A13-4126-BB8E-5436707FC4AB}">
           <p14:sldIdLst>
             <p14:sldId id="508"/>
             <p14:sldId id="509"/>
@@ -179,7 +179,7 @@
             <p14:sldId id="526"/>
           </p14:sldIdLst>
         </p14:section>
-        <p14:section name="Conclusion" id="{BC8083E7-5324-4637-ABE9-88A592F79812}">
+        <p14:section name="Обобщение" id="{BC8083E7-5324-4637-ABE9-88A592F79812}">
           <p14:sldIdLst>
             <p14:sldId id="510"/>
             <p14:sldId id="531"/>
@@ -311,7 +311,7 @@
           <a:p>
             <a:fld id="{4E087215-0C8F-4762-A664-737A353EC9A4}" type="datetimeFigureOut">
               <a:rPr lang="bg-BG" smtClean="0"/>
-              <a:t>11.1.2023 г.</a:t>
+              <a:t>13.01.23 г.</a:t>
             </a:fld>
             <a:endParaRPr lang="bg-BG"/>
           </a:p>
@@ -502,7 +502,7 @@
           <a:p>
             <a:fld id="{72D84649-876A-46C9-8472-14CB09C070D8}" type="datetimeFigureOut">
               <a:rPr lang="en-US" smtClean="0"/>
-              <a:t>1/11/2023</a:t>
+              <a:t>1/13/23</a:t>
             </a:fld>
             <a:endParaRPr lang="en-US"/>
           </a:p>
@@ -8454,7 +8454,8 @@
           <a:p>
             <a:r>
               <a:rPr lang="bg" sz="3550" dirty="0">
-                <a:latin typeface="Consolas"/>
+                <a:latin typeface="Calibri" panose="020F0502020204030204" pitchFamily="34" charset="0"/>
+                <a:cs typeface="Calibri" panose="020F0502020204030204" pitchFamily="34" charset="0"/>
               </a:rPr>
               <a:t>Обработка на последователни елементи с променлива дължина</a:t>
             </a:r>
@@ -8484,7 +8485,11 @@
           <a:p>
             <a:r>
               <a:rPr lang="en-US" sz="4750" dirty="0" err="1"/>
-              <a:t>Списък</a:t>
+              <a:t>Списъ</a:t>
+            </a:r>
+            <a:r>
+              <a:rPr lang="bg-BG" sz="4750" dirty="0"/>
+              <a:t>ци</a:t>
             </a:r>
             <a:endParaRPr lang="en-US" dirty="0" err="1"/>
           </a:p>
@@ -8627,8 +8632,8 @@
         </p:nvGrpSpPr>
         <p:grpSpPr>
           <a:xfrm>
-            <a:off x="3329919" y="2406501"/>
-            <a:ext cx="5532165" cy="2044998"/>
+            <a:off x="3362959" y="2774169"/>
+            <a:ext cx="5466081" cy="1877499"/>
             <a:chOff x="3503612" y="2606207"/>
             <a:chExt cx="3810000" cy="1408389"/>
           </a:xfrm>
@@ -18324,14 +18329,21 @@
                 <a:ea typeface="+mj-lt"/>
                 <a:cs typeface="+mj-lt"/>
               </a:rPr>
-              <a:t> </a:t>
+              <a:t> на </a:t>
             </a:r>
             <a:r>
               <a:rPr lang="en-US" sz="5350" dirty="0" err="1">
                 <a:ea typeface="+mj-lt"/>
                 <a:cs typeface="+mj-lt"/>
               </a:rPr>
-              <a:t>на</a:t>
+              <a:t>спис</a:t>
+            </a:r>
+            <a:r>
+              <a:rPr lang="bg-BG" sz="5350" dirty="0" err="1">
+                <a:ea typeface="+mj-lt"/>
+                <a:cs typeface="+mj-lt"/>
+              </a:rPr>
+              <a:t>ъци</a:t>
             </a:r>
             <a:r>
               <a:rPr lang="en-US" sz="5350" dirty="0">
@@ -18345,14 +18357,14 @@
                 <a:ea typeface="+mj-lt"/>
                 <a:cs typeface="+mj-lt"/>
               </a:rPr>
-              <a:t>списък</a:t>
+              <a:t>и</a:t>
             </a:r>
             <a:r>
               <a:rPr lang="en-US" sz="5350" dirty="0">
                 <a:ea typeface="+mj-lt"/>
                 <a:cs typeface="+mj-lt"/>
               </a:rPr>
-              <a:t> и </a:t>
+              <a:t> </a:t>
             </a:r>
             <a:r>
               <a:rPr lang="en-US" sz="5350" dirty="0" err="1">
@@ -18361,7 +18373,14 @@
               </a:rPr>
               <a:t>масив</a:t>
             </a:r>
-            <a:endParaRPr lang="bg-BG" dirty="0" err="1"/>
+            <a:r>
+              <a:rPr lang="bg-BG" sz="5350" dirty="0">
+                <a:ea typeface="+mj-lt"/>
+                <a:cs typeface="+mj-lt"/>
+              </a:rPr>
+              <a:t>и</a:t>
+            </a:r>
+            <a:endParaRPr lang="bg-BG" dirty="0"/>
           </a:p>
         </p:txBody>
       </p:sp>
@@ -18432,9 +18451,12 @@
             </a:pPr>
             <a:r>
               <a:rPr lang="en-US" dirty="0" err="1"/>
-              <a:t>Списък</a:t>
-            </a:r>
-            <a:endParaRPr lang="bg-BG" dirty="0" err="1"/>
+              <a:t>Списъ</a:t>
+            </a:r>
+            <a:r>
+              <a:rPr lang="bg-BG" dirty="0"/>
+              <a:t>ци</a:t>
+            </a:r>
           </a:p>
           <a:p>
             <a:pPr marL="445770" indent="-445770">
@@ -19013,7 +19035,7 @@
         </p:nvSpPr>
         <p:spPr>
           <a:xfrm>
-            <a:off x="190402" y="1196125"/>
+            <a:off x="336000" y="1190245"/>
             <a:ext cx="12227528" cy="5562885"/>
           </a:xfrm>
         </p:spPr>
@@ -19032,7 +19054,7 @@
               </a:buClr>
             </a:pPr>
             <a:r>
-              <a:rPr lang="en-US" sz="3350" b="1" dirty="0" err="1">
+              <a:rPr lang="en-US" sz="3000" b="1" dirty="0" err="1">
                 <a:solidFill>
                   <a:schemeClr val="bg1"/>
                 </a:solidFill>
@@ -19040,23 +19062,15 @@
               <a:t>Сортиране</a:t>
             </a:r>
             <a:r>
-              <a:rPr lang="en-US" sz="3350" b="1" dirty="0">
+              <a:rPr lang="en-US" sz="3000" b="1" dirty="0">
                 <a:solidFill>
                   <a:schemeClr val="bg1"/>
                 </a:solidFill>
               </a:rPr>
-              <a:t> </a:t>
-            </a:r>
-            <a:r>
-              <a:rPr lang="en-US" sz="3350" b="1" dirty="0" err="1">
-                <a:solidFill>
-                  <a:schemeClr val="bg1"/>
-                </a:solidFill>
-              </a:rPr>
-              <a:t>на</a:t>
-            </a:r>
-            <a:r>
-              <a:rPr lang="en-US" sz="3350" b="1" dirty="0">
+              <a:t> на</a:t>
+            </a:r>
+            <a:r>
+              <a:rPr lang="en-US" sz="3000" b="1" dirty="0">
                 <a:solidFill>
                   <a:schemeClr val="bg1"/>
                 </a:solidFill>
@@ -19066,7 +19080,7 @@
               <a:t> </a:t>
             </a:r>
             <a:r>
-              <a:rPr lang="en-US" sz="3350" b="1" dirty="0" err="1">
+              <a:rPr lang="en-US" sz="3000" b="1" dirty="0" err="1">
                 <a:solidFill>
                   <a:schemeClr val="bg1"/>
                 </a:solidFill>
@@ -19076,7 +19090,7 @@
               <a:t>списъци</a:t>
             </a:r>
             <a:r>
-              <a:rPr lang="en-US" sz="3350" b="1" dirty="0">
+              <a:rPr lang="en-US" sz="3000" b="1" dirty="0">
                 <a:solidFill>
                   <a:schemeClr val="bg1"/>
                 </a:solidFill>
@@ -19086,60 +19100,50 @@
               <a:t> </a:t>
             </a:r>
             <a:r>
-              <a:rPr lang="en-US" sz="3350" dirty="0"/>
+              <a:rPr lang="en-US" sz="3000" dirty="0"/>
               <a:t>== </a:t>
             </a:r>
             <a:r>
-              <a:rPr lang="en-US" sz="3350" dirty="0" err="1"/>
+              <a:rPr lang="en-US" sz="3000" dirty="0" err="1"/>
               <a:t>пренареждане</a:t>
             </a:r>
             <a:r>
-              <a:rPr lang="en-US" sz="3350" dirty="0"/>
+              <a:rPr lang="en-US" sz="3000" dirty="0"/>
+              <a:t> на </a:t>
+            </a:r>
+            <a:r>
+              <a:rPr lang="en-US" sz="3000" dirty="0" err="1"/>
+              <a:t>елементите</a:t>
+            </a:r>
+            <a:r>
+              <a:rPr lang="en-US" sz="3000" dirty="0"/>
+              <a:t>:</a:t>
+            </a:r>
+            <a:r>
+              <a:rPr lang="bg-BG" sz="3000" dirty="0"/>
               <a:t> </a:t>
             </a:r>
             <a:r>
-              <a:rPr lang="en-US" sz="3350" dirty="0" err="1"/>
-              <a:t>на</a:t>
-            </a:r>
-            <a:r>
-              <a:rPr lang="en-US" sz="3350" dirty="0"/>
-              <a:t> </a:t>
-            </a:r>
-            <a:r>
-              <a:rPr lang="en-US" sz="3350" dirty="0" err="1"/>
-              <a:t>елементите:</a:t>
-            </a:r>
-            <a:r>
-              <a:rPr lang="en-US" sz="3350" b="1" dirty="0" err="1">
+              <a:rPr lang="en-US" sz="3000" b="1" dirty="0">
                 <a:solidFill>
                   <a:schemeClr val="bg1"/>
                 </a:solidFill>
                 <a:latin typeface="Calibri"/>
                 <a:cs typeface="Calibri"/>
               </a:rPr>
-              <a:t>Sort</a:t>
-            </a:r>
-            <a:r>
-              <a:rPr lang="en-US" sz="3350" b="1" dirty="0">
-                <a:solidFill>
-                  <a:schemeClr val="bg1"/>
+              <a:t>Sort()</a:t>
+            </a:r>
+            <a:r>
+              <a:rPr lang="en-US" sz="3000" dirty="0">
+                <a:solidFill>
+                  <a:srgbClr val="234465"/>
                 </a:solidFill>
                 <a:latin typeface="Calibri"/>
                 <a:cs typeface="Calibri"/>
               </a:rPr>
-              <a:t>()</a:t>
-            </a:r>
-            <a:r>
-              <a:rPr lang="en-US" sz="3350" dirty="0">
-                <a:solidFill>
-                  <a:srgbClr val="234465"/>
-                </a:solidFill>
-                <a:latin typeface="Calibri"/>
-                <a:cs typeface="Calibri"/>
-              </a:rPr>
               <a:t> </a:t>
             </a:r>
-            <a:endParaRPr lang="en-US" sz="3350" b="1">
+            <a:endParaRPr lang="en-US" sz="3000" b="1" dirty="0">
               <a:solidFill>
                 <a:schemeClr val="bg1"/>
               </a:solidFill>
@@ -19153,7 +19157,7 @@
               </a:lnSpc>
             </a:pPr>
             <a:r>
-              <a:rPr lang="en-US" sz="3150" dirty="0" err="1">
+              <a:rPr lang="en-US" sz="3000" dirty="0" err="1">
                 <a:solidFill>
                   <a:srgbClr val="234465"/>
                 </a:solidFill>
@@ -19161,7 +19165,7 @@
               <a:t>Елементите</a:t>
             </a:r>
             <a:r>
-              <a:rPr lang="en-US" sz="3150" dirty="0">
+              <a:rPr lang="en-US" sz="3000" dirty="0">
                 <a:solidFill>
                   <a:srgbClr val="234465"/>
                 </a:solidFill>
@@ -19169,7 +19173,7 @@
               <a:t> </a:t>
             </a:r>
             <a:r>
-              <a:rPr lang="en-US" sz="3150" dirty="0" err="1">
+              <a:rPr lang="en-US" sz="3000" dirty="0" err="1">
                 <a:solidFill>
                   <a:srgbClr val="234465"/>
                 </a:solidFill>
@@ -19177,7 +19181,7 @@
               <a:t>трябва</a:t>
             </a:r>
             <a:r>
-              <a:rPr lang="en-US" sz="3150" dirty="0">
+              <a:rPr lang="en-US" sz="3000" dirty="0">
                 <a:solidFill>
                   <a:srgbClr val="234465"/>
                 </a:solidFill>
@@ -19185,7 +19189,7 @@
               <a:t> </a:t>
             </a:r>
             <a:r>
-              <a:rPr lang="en-US" sz="3150" dirty="0" err="1">
+              <a:rPr lang="en-US" sz="3000" dirty="0" err="1">
                 <a:solidFill>
                   <a:srgbClr val="234465"/>
                 </a:solidFill>
@@ -19193,7 +19197,7 @@
               <a:t>да</a:t>
             </a:r>
             <a:r>
-              <a:rPr lang="en-US" sz="3150" dirty="0">
+              <a:rPr lang="en-US" sz="3000" dirty="0">
                 <a:solidFill>
                   <a:srgbClr val="234465"/>
                 </a:solidFill>
@@ -19201,7 +19205,7 @@
               <a:t> </a:t>
             </a:r>
             <a:r>
-              <a:rPr lang="en-US" sz="3150" dirty="0" err="1">
+              <a:rPr lang="en-US" sz="3000" dirty="0" err="1">
                 <a:solidFill>
                   <a:srgbClr val="234465"/>
                 </a:solidFill>
@@ -19209,7 +19213,7 @@
               <a:t>могат</a:t>
             </a:r>
             <a:r>
-              <a:rPr lang="en-US" sz="3150" dirty="0">
+              <a:rPr lang="en-US" sz="3000" dirty="0">
                 <a:solidFill>
                   <a:srgbClr val="234465"/>
                 </a:solidFill>
@@ -19217,7 +19221,7 @@
               <a:t> </a:t>
             </a:r>
             <a:r>
-              <a:rPr lang="en-US" sz="3150" dirty="0" err="1">
+              <a:rPr lang="en-US" sz="3000" dirty="0" err="1">
                 <a:solidFill>
                   <a:srgbClr val="234465"/>
                 </a:solidFill>
@@ -19225,7 +19229,7 @@
               <a:t>да</a:t>
             </a:r>
             <a:r>
-              <a:rPr lang="en-US" sz="3150" dirty="0">
+              <a:rPr lang="en-US" sz="3000" dirty="0">
                 <a:solidFill>
                   <a:srgbClr val="234465"/>
                 </a:solidFill>
@@ -19233,7 +19237,7 @@
               <a:t> </a:t>
             </a:r>
             <a:r>
-              <a:rPr lang="en-US" sz="3150" dirty="0" err="1">
+              <a:rPr lang="en-US" sz="3000" dirty="0" err="1">
                 <a:solidFill>
                   <a:srgbClr val="234465"/>
                 </a:solidFill>
@@ -19241,7 +19245,7 @@
               <a:t>се</a:t>
             </a:r>
             <a:r>
-              <a:rPr lang="en-US" sz="3150" dirty="0">
+              <a:rPr lang="en-US" sz="3000" dirty="0">
                 <a:solidFill>
                   <a:srgbClr val="234465"/>
                 </a:solidFill>
@@ -19249,7 +19253,7 @@
               <a:t> </a:t>
             </a:r>
             <a:r>
-              <a:rPr lang="en-US" sz="3150" b="1" dirty="0" err="1">
+              <a:rPr lang="en-US" sz="3000" b="1" dirty="0" err="1">
                 <a:solidFill>
                   <a:schemeClr val="bg1"/>
                 </a:solidFill>
@@ -19257,42 +19261,42 @@
               <a:t>сравняват</a:t>
             </a:r>
             <a:r>
-              <a:rPr lang="en-US" sz="3150" dirty="0"/>
+              <a:rPr lang="en-US" sz="3000" dirty="0"/>
               <a:t>, </a:t>
             </a:r>
             <a:r>
-              <a:rPr lang="en-US" sz="3150" dirty="0" err="1"/>
+              <a:rPr lang="en-US" sz="3000" dirty="0" err="1"/>
               <a:t>например</a:t>
             </a:r>
             <a:r>
-              <a:rPr lang="en-US" sz="3150" dirty="0"/>
+              <a:rPr lang="en-US" sz="3000" dirty="0"/>
               <a:t> </a:t>
             </a:r>
             <a:r>
-              <a:rPr lang="en-US" sz="3150" dirty="0" err="1"/>
+              <a:rPr lang="en-US" sz="3000" dirty="0" err="1"/>
               <a:t>числа</a:t>
             </a:r>
             <a:r>
-              <a:rPr lang="en-US" sz="3150" dirty="0"/>
+              <a:rPr lang="en-US" sz="3000" dirty="0"/>
               <a:t>, </a:t>
             </a:r>
             <a:r>
-              <a:rPr lang="en-US" sz="3150" dirty="0" err="1"/>
+              <a:rPr lang="en-US" sz="3000" dirty="0" err="1"/>
               <a:t>низове</a:t>
             </a:r>
             <a:r>
-              <a:rPr lang="en-US" sz="3150" dirty="0"/>
+              <a:rPr lang="en-US" sz="3000" dirty="0"/>
               <a:t>, </a:t>
             </a:r>
             <a:r>
-              <a:rPr lang="en-US" sz="3150" dirty="0" err="1"/>
+              <a:rPr lang="en-US" sz="3000" dirty="0" err="1"/>
               <a:t>дати</a:t>
             </a:r>
             <a:r>
-              <a:rPr lang="en-US" sz="3150" dirty="0"/>
+              <a:rPr lang="en-US" sz="3000" dirty="0"/>
               <a:t>, …</a:t>
             </a:r>
-            <a:endParaRPr lang="en-US" sz="3150" dirty="0">
+            <a:endParaRPr lang="en-US" sz="3000" dirty="0">
               <a:cs typeface="Calibri"/>
             </a:endParaRPr>
           </a:p>
@@ -22959,6 +22963,13 @@
               <a:t>числа</a:t>
             </a:r>
             <a:r>
+              <a:rPr lang="bg-BG" sz="3400" dirty="0">
+                <a:ea typeface="+mn-lt"/>
+                <a:cs typeface="+mn-lt"/>
+              </a:rPr>
+              <a:t>,</a:t>
+            </a:r>
+            <a:r>
               <a:rPr lang="en-US" sz="3400" dirty="0">
                 <a:ea typeface="+mn-lt"/>
                 <a:cs typeface="+mn-lt"/>
@@ -25687,7 +25698,7 @@
               </a:rPr>
               <a:t>)</a:t>
             </a:r>
-            <a:endParaRPr lang="bg-BG">
+            <a:endParaRPr lang="bg-BG" dirty="0">
               <a:solidFill>
                 <a:schemeClr val="bg2"/>
               </a:solidFill>
@@ -25712,7 +25723,15 @@
                   <a:schemeClr val="bg2"/>
                 </a:solidFill>
               </a:rPr>
-              <a:t>Мога</a:t>
+              <a:t>Мо</a:t>
+            </a:r>
+            <a:r>
+              <a:rPr lang="bg-BG" sz="3400" dirty="0" err="1">
+                <a:solidFill>
+                  <a:schemeClr val="bg2"/>
+                </a:solidFill>
+              </a:rPr>
+              <a:t>жем</a:t>
             </a:r>
             <a:r>
               <a:rPr lang="en-US" sz="3400" dirty="0">
@@ -25750,15 +25769,7 @@
               <a:t>добавям</a:t>
             </a:r>
             <a:r>
-              <a:rPr lang="en-US" sz="3400" dirty="0">
-                <a:solidFill>
-                  <a:schemeClr val="bg2"/>
-                </a:solidFill>
-              </a:rPr>
-              <a:t> / </a:t>
-            </a:r>
-            <a:r>
-              <a:rPr lang="en-US" sz="3400" b="1" dirty="0" err="1">
+              <a:rPr lang="bg-BG" sz="3400" b="1" dirty="0">
                 <a:solidFill>
                   <a:schemeClr val="bg1">
                     <a:lumMod val="60000"/>
@@ -25766,7 +25777,7 @@
                   </a:schemeClr>
                 </a:solidFill>
               </a:rPr>
-              <a:t>премахвам</a:t>
+              <a:t>е</a:t>
             </a:r>
             <a:r>
               <a:rPr lang="en-US" sz="3400" dirty="0">
@@ -25774,7 +25785,7 @@
                   <a:schemeClr val="bg2"/>
                 </a:solidFill>
               </a:rPr>
-              <a:t> /</a:t>
+              <a:t> / </a:t>
             </a:r>
             <a:r>
               <a:rPr lang="en-US" sz="3400" b="1" dirty="0" err="1">
@@ -25784,21 +25795,25 @@
                     <a:lumOff val="40000"/>
                   </a:schemeClr>
                 </a:solidFill>
-                <a:ea typeface="+mn-lt"/>
-                <a:cs typeface="+mn-lt"/>
-              </a:rPr>
-              <a:t>вмъкна</a:t>
-            </a:r>
-            <a:r>
-              <a:rPr lang="en-US" sz="3400" b="1" dirty="0">
+              </a:rPr>
+              <a:t>премахвам</a:t>
+            </a:r>
+            <a:r>
+              <a:rPr lang="bg-BG" sz="3400" b="1" dirty="0">
                 <a:solidFill>
                   <a:schemeClr val="bg1">
                     <a:lumMod val="60000"/>
                     <a:lumOff val="40000"/>
                   </a:schemeClr>
                 </a:solidFill>
-                <a:ea typeface="+mn-lt"/>
-                <a:cs typeface="+mn-lt"/>
+              </a:rPr>
+              <a:t>е</a:t>
+            </a:r>
+            <a:r>
+              <a:rPr lang="en-US" sz="3400" dirty="0">
+                <a:solidFill>
+                  <a:schemeClr val="bg2"/>
+                </a:solidFill>
               </a:rPr>
               <a:t> </a:t>
             </a:r>
@@ -25823,7 +25838,18 @@
               </a:rPr>
               <a:t>модифицирам</a:t>
             </a:r>
-            <a:endParaRPr lang="en-US" sz="3400" dirty="0" err="1">
+            <a:r>
+              <a:rPr lang="bg-BG" sz="3400" b="1" dirty="0">
+                <a:solidFill>
+                  <a:schemeClr val="bg1">
+                    <a:lumMod val="60000"/>
+                    <a:lumOff val="40000"/>
+                  </a:schemeClr>
+                </a:solidFill>
+              </a:rPr>
+              <a:t>е</a:t>
+            </a:r>
+            <a:endParaRPr lang="en-US" sz="3400" dirty="0">
               <a:solidFill>
                 <a:schemeClr val="bg1">
                   <a:lumMod val="60000"/>
@@ -26021,12 +26047,28 @@
               </a:buClr>
             </a:pPr>
             <a:r>
-              <a:rPr lang="en-US" sz="3400">
+              <a:rPr lang="en-US" sz="3400" dirty="0" err="1">
                 <a:solidFill>
                   <a:schemeClr val="bg2"/>
                 </a:solidFill>
               </a:rPr>
-              <a:t>Достъп до</a:t>
+              <a:t>Достъп</a:t>
+            </a:r>
+            <a:r>
+              <a:rPr lang="en-US" sz="3400" dirty="0">
+                <a:solidFill>
+                  <a:schemeClr val="bg2"/>
+                </a:solidFill>
+              </a:rPr>
+              <a:t> </a:t>
+            </a:r>
+            <a:r>
+              <a:rPr lang="en-US" sz="3400" dirty="0" err="1">
+                <a:solidFill>
+                  <a:schemeClr val="bg2"/>
+                </a:solidFill>
+              </a:rPr>
+              <a:t>до</a:t>
             </a:r>
             <a:r>
               <a:rPr lang="en-US" sz="3400" dirty="0">
@@ -26139,7 +26181,23 @@
                   <a:schemeClr val="bg2"/>
                 </a:solidFill>
               </a:rPr>
-              <a:t>Опечатване</a:t>
+              <a:t>О</a:t>
+            </a:r>
+            <a:r>
+              <a:rPr lang="bg-BG" sz="3400" dirty="0" err="1">
+                <a:solidFill>
+                  <a:schemeClr val="bg2"/>
+                </a:solidFill>
+              </a:rPr>
+              <a:t>т</a:t>
+            </a:r>
+            <a:r>
+              <a:rPr lang="en-US" sz="3400" dirty="0" err="1">
+                <a:solidFill>
+                  <a:schemeClr val="bg2"/>
+                </a:solidFill>
+              </a:rPr>
+              <a:t>печатване</a:t>
             </a:r>
             <a:r>
               <a:rPr lang="en-US" sz="3400" dirty="0">
@@ -26147,7 +26205,7 @@
                   <a:schemeClr val="bg2"/>
                 </a:solidFill>
               </a:rPr>
-              <a:t> </a:t>
+              <a:t> на </a:t>
             </a:r>
             <a:r>
               <a:rPr lang="en-US" sz="3400" dirty="0" err="1">
@@ -26155,7 +26213,7 @@
                   <a:schemeClr val="bg2"/>
                 </a:solidFill>
               </a:rPr>
-              <a:t>на</a:t>
+              <a:t>елементите</a:t>
             </a:r>
             <a:r>
               <a:rPr lang="en-US" sz="3400" dirty="0">
@@ -26163,39 +26221,7 @@
                   <a:schemeClr val="bg2"/>
                 </a:solidFill>
               </a:rPr>
-              <a:t> </a:t>
-            </a:r>
-            <a:r>
-              <a:rPr lang="en-US" sz="3400" dirty="0" err="1">
-                <a:solidFill>
-                  <a:schemeClr val="bg2"/>
-                </a:solidFill>
-              </a:rPr>
-              <a:t>елементите</a:t>
-            </a:r>
-            <a:r>
-              <a:rPr lang="en-US" sz="3400" dirty="0">
-                <a:solidFill>
-                  <a:schemeClr val="bg2"/>
-                </a:solidFill>
-              </a:rPr>
-              <a:t> </a:t>
-            </a:r>
-            <a:r>
-              <a:rPr lang="en-US" sz="3400" dirty="0" err="1">
-                <a:solidFill>
-                  <a:schemeClr val="bg2"/>
-                </a:solidFill>
-              </a:rPr>
-              <a:t>на</a:t>
-            </a:r>
-            <a:r>
-              <a:rPr lang="en-US" sz="3400" dirty="0">
-                <a:solidFill>
-                  <a:schemeClr val="bg2"/>
-                </a:solidFill>
-              </a:rPr>
-              <a:t> </a:t>
+              <a:t> на </a:t>
             </a:r>
             <a:r>
               <a:rPr lang="en-US" sz="3400" dirty="0" err="1">
@@ -27751,7 +27777,13 @@
               <a:rPr lang="en-GB" sz="5350" dirty="0" err="1">
                 <a:cs typeface="Arial"/>
               </a:rPr>
-              <a:t>Списък</a:t>
+              <a:t>Списъ</a:t>
+            </a:r>
+            <a:r>
+              <a:rPr lang="bg-BG" sz="5350" dirty="0">
+                <a:cs typeface="Arial"/>
+              </a:rPr>
+              <a:t>ци</a:t>
             </a:r>
             <a:endParaRPr lang="en-GB" dirty="0" err="1"/>
           </a:p>
@@ -27842,7 +27874,7 @@
         </p:nvSpPr>
         <p:spPr>
           <a:xfrm>
-            <a:off x="1673561" y="1121143"/>
+            <a:off x="1430430" y="1108911"/>
             <a:ext cx="10515017" cy="5546589"/>
           </a:xfrm>
         </p:spPr>
@@ -27942,8 +27974,8 @@
         </p:nvSpPr>
         <p:spPr>
           <a:xfrm>
-            <a:off x="2330676" y="1700808"/>
-            <a:ext cx="8805884" cy="4988590"/>
+            <a:off x="2528127" y="1743855"/>
+            <a:ext cx="8805884" cy="4911645"/>
           </a:xfrm>
           <a:prstGeom prst="rect">
             <a:avLst/>
@@ -28077,6 +28109,68 @@
           </a:lstStyle>
           <a:p>
             <a:r>
+              <a:rPr lang="en-US" sz="2400" i="1" dirty="0">
+                <a:solidFill>
+                  <a:schemeClr val="accent2"/>
+                </a:solidFill>
+                <a:latin typeface="Consolas"/>
+              </a:rPr>
+              <a:t>// </a:t>
+            </a:r>
+            <a:r>
+              <a:rPr lang="en-US" sz="2400" i="1" dirty="0" err="1">
+                <a:solidFill>
+                  <a:schemeClr val="accent2"/>
+                </a:solidFill>
+                <a:latin typeface="Consolas"/>
+              </a:rPr>
+              <a:t>Създаване</a:t>
+            </a:r>
+            <a:r>
+              <a:rPr lang="en-US" sz="2400" i="1" dirty="0">
+                <a:solidFill>
+                  <a:schemeClr val="accent2"/>
+                </a:solidFill>
+                <a:latin typeface="Consolas"/>
+              </a:rPr>
+              <a:t> на </a:t>
+            </a:r>
+            <a:r>
+              <a:rPr lang="en-US" sz="2400" i="1" dirty="0" err="1">
+                <a:solidFill>
+                  <a:schemeClr val="accent2"/>
+                </a:solidFill>
+                <a:latin typeface="Consolas"/>
+              </a:rPr>
+              <a:t>списък</a:t>
+            </a:r>
+            <a:r>
+              <a:rPr lang="en-US" sz="2400" i="1" dirty="0">
+                <a:solidFill>
+                  <a:schemeClr val="accent2"/>
+                </a:solidFill>
+                <a:latin typeface="Consolas"/>
+              </a:rPr>
+              <a:t> от </a:t>
+            </a:r>
+            <a:r>
+              <a:rPr lang="en-US" sz="2400" i="1" dirty="0" err="1">
+                <a:solidFill>
+                  <a:schemeClr val="accent2"/>
+                </a:solidFill>
+                <a:latin typeface="Consolas"/>
+              </a:rPr>
+              <a:t>низове</a:t>
+            </a:r>
+            <a:endParaRPr lang="bg-BG" sz="2400" dirty="0">
+              <a:solidFill>
+                <a:schemeClr val="bg1"/>
+              </a:solidFill>
+              <a:latin typeface="Consolas"/>
+            </a:endParaRPr>
+          </a:p>
+          <a:p>
+            <a:r>
               <a:rPr lang="en-US" sz="2400" dirty="0">
                 <a:solidFill>
                   <a:schemeClr val="bg1"/>
@@ -28122,32 +28216,64 @@
                 </a:solidFill>
                 <a:latin typeface="Consolas"/>
               </a:rPr>
-              <a:t>// Създаване на списък от низове</a:t>
-            </a:r>
-            <a:endParaRPr lang="en-US" sz="2400" i="1" dirty="0">
-              <a:solidFill>
-                <a:schemeClr val="accent2"/>
-              </a:solidFill>
-            </a:endParaRPr>
-          </a:p>
-          <a:p>
+              <a:t>// </a:t>
+            </a:r>
+            <a:r>
+              <a:rPr lang="en-US" sz="2400" i="1" dirty="0" err="1">
+                <a:solidFill>
+                  <a:schemeClr val="accent2"/>
+                </a:solidFill>
+                <a:latin typeface="Consolas"/>
+              </a:rPr>
+              <a:t>Добавяне</a:t>
+            </a:r>
+            <a:r>
+              <a:rPr lang="en-US" sz="2400" i="1" dirty="0">
+                <a:solidFill>
+                  <a:schemeClr val="accent2"/>
+                </a:solidFill>
+                <a:latin typeface="Consolas"/>
+              </a:rPr>
+              <a:t> на </a:t>
+            </a:r>
+            <a:r>
+              <a:rPr lang="en-US" sz="2400" i="1" dirty="0" err="1">
+                <a:solidFill>
+                  <a:schemeClr val="accent2"/>
+                </a:solidFill>
+                <a:latin typeface="Consolas"/>
+              </a:rPr>
+              <a:t>елементи</a:t>
+            </a:r>
+            <a:endParaRPr lang="bg-BG" sz="2400" dirty="0"/>
+          </a:p>
+          <a:p>
+            <a:r>
+              <a:rPr lang="en-US" sz="2400" dirty="0" err="1">
+                <a:solidFill>
+                  <a:schemeClr val="tx1"/>
+                </a:solidFill>
+                <a:latin typeface="Consolas"/>
+              </a:rPr>
+              <a:t>names.</a:t>
+            </a:r>
+            <a:r>
+              <a:rPr lang="en-US" sz="2400" dirty="0" err="1">
+                <a:solidFill>
+                  <a:schemeClr val="bg1"/>
+                </a:solidFill>
+                <a:latin typeface="Consolas"/>
+              </a:rPr>
+              <a:t>Add</a:t>
+            </a:r>
             <a:r>
               <a:rPr lang="en-US" sz="2400" dirty="0">
                 <a:solidFill>
-                  <a:schemeClr val="tx1"/>
+                  <a:schemeClr val="bg1"/>
                 </a:solidFill>
                 <a:latin typeface="Consolas"/>
               </a:rPr>
-              <a:t>names.</a:t>
-            </a:r>
-            <a:r>
-              <a:rPr lang="en-US" sz="2400" dirty="0">
-                <a:solidFill>
-                  <a:schemeClr val="bg1"/>
-                </a:solidFill>
-                <a:latin typeface="Consolas"/>
-              </a:rPr>
-              <a:t>Add(</a:t>
+              <a:t>(</a:t>
             </a:r>
             <a:r>
               <a:rPr lang="en-US" sz="2400" dirty="0">
@@ -28277,36 +28403,53 @@
             </a:r>
           </a:p>
           <a:p>
-            <a:r>
-              <a:rPr lang="en-US" sz="2400" i="1" dirty="0">
-                <a:solidFill>
-                  <a:schemeClr val="accent2"/>
-                </a:solidFill>
-                <a:latin typeface="Consolas"/>
-              </a:rPr>
-              <a:t>// Добавяне на елементи</a:t>
-            </a:r>
-            <a:endParaRPr lang="en-US" sz="2400" i="1" dirty="0">
-              <a:solidFill>
-                <a:schemeClr val="accent2"/>
-              </a:solidFill>
-            </a:endParaRPr>
-          </a:p>
-          <a:p>
             <a:pPr>
               <a:spcBef>
                 <a:spcPts val="0"/>
               </a:spcBef>
             </a:pPr>
             <a:r>
-              <a:rPr lang="en-US" sz="2400" dirty="0">
-                <a:solidFill>
-                  <a:schemeClr val="tx1"/>
+              <a:rPr lang="en-US" sz="2400" i="1" dirty="0">
+                <a:solidFill>
+                  <a:schemeClr val="accent2"/>
                 </a:solidFill>
                 <a:latin typeface="Consolas"/>
               </a:rPr>
-              <a:t>foreach (var name in names)</a:t>
-            </a:r>
+              <a:t>// </a:t>
+            </a:r>
+            <a:r>
+              <a:rPr lang="en-US" sz="2400" i="1" dirty="0" err="1">
+                <a:solidFill>
+                  <a:schemeClr val="accent2"/>
+                </a:solidFill>
+                <a:latin typeface="Consolas"/>
+              </a:rPr>
+              <a:t>Отпечатване</a:t>
+            </a:r>
+            <a:r>
+              <a:rPr lang="en-US" sz="2400" i="1" dirty="0">
+                <a:solidFill>
+                  <a:schemeClr val="accent2"/>
+                </a:solidFill>
+                <a:latin typeface="Consolas"/>
+              </a:rPr>
+              <a:t> на </a:t>
+            </a:r>
+            <a:r>
+              <a:rPr lang="en-US" sz="2400" i="1" dirty="0" err="1">
+                <a:solidFill>
+                  <a:schemeClr val="accent2"/>
+                </a:solidFill>
+                <a:latin typeface="Consolas"/>
+              </a:rPr>
+              <a:t>елементи</a:t>
+            </a:r>
+            <a:endParaRPr lang="bg-BG" sz="2400" dirty="0">
+              <a:solidFill>
+                <a:schemeClr val="tx1"/>
+              </a:solidFill>
+              <a:latin typeface="Consolas"/>
+            </a:endParaRPr>
           </a:p>
           <a:p>
             <a:pPr>
@@ -28321,10 +28464,41 @@
                 </a:solidFill>
                 <a:latin typeface="Consolas"/>
               </a:rPr>
+              <a:t>foreach (var name in names)</a:t>
+            </a:r>
+          </a:p>
+          <a:p>
+            <a:pPr>
+              <a:spcBef>
+                <a:spcPts val="0"/>
+              </a:spcBef>
+            </a:pPr>
+            <a:r>
+              <a:rPr lang="en-US" sz="2400" dirty="0">
+                <a:solidFill>
+                  <a:schemeClr val="tx1"/>
+                </a:solidFill>
+                <a:latin typeface="Consolas"/>
+              </a:rPr>
               <a:t>  Console.WriteLine(name);</a:t>
             </a:r>
-          </a:p>
-          <a:p>
+            <a:endParaRPr lang="bg-BG" sz="2400" dirty="0">
+              <a:solidFill>
+                <a:schemeClr val="tx1"/>
+              </a:solidFill>
+              <a:latin typeface="Consolas"/>
+            </a:endParaRPr>
+          </a:p>
+          <a:p>
+            <a:r>
+              <a:rPr lang="en-US" sz="2400" dirty="0" err="1">
+                <a:solidFill>
+                  <a:schemeClr val="tx1"/>
+                </a:solidFill>
+                <a:latin typeface="Consolas"/>
+              </a:rPr>
+              <a:t>Console.WriteLine</a:t>
+            </a:r>
             <a:r>
               <a:rPr lang="en-US" sz="2400" dirty="0">
                 <a:solidFill>
@@ -28332,7 +28506,7 @@
                 </a:solidFill>
                 <a:latin typeface="Consolas"/>
               </a:rPr>
-              <a:t>Console.WriteLine(</a:t>
+              <a:t>(</a:t>
             </a:r>
             <a:r>
               <a:rPr lang="en-US" sz="2400" dirty="0">
@@ -28370,22 +28544,6 @@
               </a:rPr>
               <a:t>);</a:t>
             </a:r>
-          </a:p>
-          <a:p>
-            <a:r>
-              <a:rPr lang="en-US" sz="2400" i="1" dirty="0">
-                <a:solidFill>
-                  <a:schemeClr val="accent2"/>
-                </a:solidFill>
-                <a:latin typeface="Consolas"/>
-              </a:rPr>
-              <a:t>// Отпечатване на елементи</a:t>
-            </a:r>
-            <a:endParaRPr lang="en-US" sz="2400" i="1" dirty="0">
-              <a:solidFill>
-                <a:schemeClr val="accent2"/>
-              </a:solidFill>
-            </a:endParaRPr>
           </a:p>
         </p:txBody>
       </p:sp>
@@ -28549,6 +28707,9 @@
                     <p:cTn id="3" fill="hold">
                       <p:stCondLst>
                         <p:cond delay="indefinite"/>
+                        <p:cond evt="onBegin" delay="0">
+                          <p:tn val="2"/>
+                        </p:cond>
                       </p:stCondLst>
                       <p:childTnLst>
                         <p:par>
@@ -28558,7 +28719,7 @@
                             </p:stCondLst>
                             <p:childTnLst>
                               <p:par>
-                                <p:cTn id="5" presetID="1" presetClass="entr" presetSubtype="0" fill="hold" nodeType="clickEffect">
+                                <p:cTn id="5" presetID="1" presetClass="entr" presetSubtype="0" fill="hold" nodeType="withEffect">
                                   <p:stCondLst>
                                     <p:cond delay="0"/>
                                   </p:stCondLst>
@@ -28573,7 +28734,7 @@
                                         <p:tgtEl>
                                           <p:spTgt spid="9">
                                             <p:txEl>
-                                              <p:pRg st="1" end="1"/>
+                                              <p:pRg st="3" end="3"/>
                                             </p:txEl>
                                           </p:spTgt>
                                         </p:tgtEl>
@@ -28604,7 +28765,7 @@
                                         <p:tgtEl>
                                           <p:spTgt spid="9">
                                             <p:txEl>
-                                              <p:pRg st="2" end="2"/>
+                                              <p:pRg st="4" end="4"/>
                                             </p:txEl>
                                           </p:spTgt>
                                         </p:tgtEl>
@@ -28635,38 +28796,7 @@
                                         <p:tgtEl>
                                           <p:spTgt spid="9">
                                             <p:txEl>
-                                              <p:pRg st="3" end="3"/>
-                                            </p:txEl>
-                                          </p:spTgt>
-                                        </p:tgtEl>
-                                        <p:attrNameLst>
-                                          <p:attrName>style.visibility</p:attrName>
-                                        </p:attrNameLst>
-                                      </p:cBhvr>
-                                      <p:to>
-                                        <p:strVal val="visible"/>
-                                      </p:to>
-                                    </p:set>
-                                  </p:childTnLst>
-                                </p:cTn>
-                              </p:par>
-                              <p:par>
-                                <p:cTn id="11" presetID="1" presetClass="entr" presetSubtype="0" fill="hold" nodeType="withEffect">
-                                  <p:stCondLst>
-                                    <p:cond delay="0"/>
-                                  </p:stCondLst>
-                                  <p:childTnLst>
-                                    <p:set>
-                                      <p:cBhvr>
-                                        <p:cTn id="12" dur="1" fill="hold">
-                                          <p:stCondLst>
-                                            <p:cond delay="0"/>
-                                          </p:stCondLst>
-                                        </p:cTn>
-                                        <p:tgtEl>
-                                          <p:spTgt spid="9">
-                                            <p:txEl>
-                                              <p:pRg st="4" end="4"/>
+                                              <p:pRg st="5" end="5"/>
                                             </p:txEl>
                                           </p:spTgt>
                                         </p:tgtEl>
@@ -28688,19 +28818,50 @@
                     </p:cTn>
                   </p:par>
                   <p:par>
-                    <p:cTn id="13" fill="hold">
+                    <p:cTn id="11" fill="hold">
                       <p:stCondLst>
                         <p:cond delay="indefinite"/>
                       </p:stCondLst>
                       <p:childTnLst>
                         <p:par>
-                          <p:cTn id="14" fill="hold">
+                          <p:cTn id="12" fill="hold">
                             <p:stCondLst>
                               <p:cond delay="0"/>
                             </p:stCondLst>
                             <p:childTnLst>
                               <p:par>
-                                <p:cTn id="15" presetID="1" presetClass="entr" presetSubtype="0" fill="hold" nodeType="clickEffect">
+                                <p:cTn id="13" presetID="1" presetClass="entr" presetSubtype="0" fill="hold" nodeType="clickEffect">
+                                  <p:stCondLst>
+                                    <p:cond delay="0"/>
+                                  </p:stCondLst>
+                                  <p:childTnLst>
+                                    <p:set>
+                                      <p:cBhvr>
+                                        <p:cTn id="14" dur="1" fill="hold">
+                                          <p:stCondLst>
+                                            <p:cond delay="0"/>
+                                          </p:stCondLst>
+                                        </p:cTn>
+                                        <p:tgtEl>
+                                          <p:spTgt spid="9">
+                                            <p:txEl>
+                                              <p:pRg st="6" end="6"/>
+                                            </p:txEl>
+                                          </p:spTgt>
+                                        </p:tgtEl>
+                                        <p:attrNameLst>
+                                          <p:attrName>style.visibility</p:attrName>
+                                        </p:attrNameLst>
+                                      </p:cBhvr>
+                                      <p:to>
+                                        <p:strVal val="visible"/>
+                                      </p:to>
+                                    </p:set>
+                                  </p:childTnLst>
+                                </p:cTn>
+                              </p:par>
+                              <p:par>
+                                <p:cTn id="15" presetID="1" presetClass="entr" presetSubtype="0" fill="hold" nodeType="withEffect">
                                   <p:stCondLst>
                                     <p:cond delay="0"/>
                                   </p:stCondLst>
@@ -28715,7 +28876,7 @@
                                         <p:tgtEl>
                                           <p:spTgt spid="9">
                                             <p:txEl>
-                                              <p:pRg st="5" end="5"/>
+                                              <p:pRg st="7" end="7"/>
                                             </p:txEl>
                                           </p:spTgt>
                                         </p:tgtEl>
@@ -28739,68 +28900,6 @@
                                     <p:set>
                                       <p:cBhvr>
                                         <p:cTn id="18" dur="1" fill="hold">
-                                          <p:stCondLst>
-                                            <p:cond delay="0"/>
-                                          </p:stCondLst>
-                                        </p:cTn>
-                                        <p:tgtEl>
-                                          <p:spTgt spid="9">
-                                            <p:txEl>
-                                              <p:pRg st="6" end="6"/>
-                                            </p:txEl>
-                                          </p:spTgt>
-                                        </p:tgtEl>
-                                        <p:attrNameLst>
-                                          <p:attrName>style.visibility</p:attrName>
-                                        </p:attrNameLst>
-                                      </p:cBhvr>
-                                      <p:to>
-                                        <p:strVal val="visible"/>
-                                      </p:to>
-                                    </p:set>
-                                  </p:childTnLst>
-                                </p:cTn>
-                              </p:par>
-                              <p:par>
-                                <p:cTn id="19" presetID="1" presetClass="entr" presetSubtype="0" fill="hold" nodeType="withEffect">
-                                  <p:stCondLst>
-                                    <p:cond delay="0"/>
-                                  </p:stCondLst>
-                                  <p:childTnLst>
-                                    <p:set>
-                                      <p:cBhvr>
-                                        <p:cTn id="20" dur="1" fill="hold">
-                                          <p:stCondLst>
-                                            <p:cond delay="0"/>
-                                          </p:stCondLst>
-                                        </p:cTn>
-                                        <p:tgtEl>
-                                          <p:spTgt spid="9">
-                                            <p:txEl>
-                                              <p:pRg st="7" end="7"/>
-                                            </p:txEl>
-                                          </p:spTgt>
-                                        </p:tgtEl>
-                                        <p:attrNameLst>
-                                          <p:attrName>style.visibility</p:attrName>
-                                        </p:attrNameLst>
-                                      </p:cBhvr>
-                                      <p:to>
-                                        <p:strVal val="visible"/>
-                                      </p:to>
-                                    </p:set>
-                                  </p:childTnLst>
-                                </p:cTn>
-                              </p:par>
-                              <p:par>
-                                <p:cTn id="21" presetID="1" presetClass="entr" presetSubtype="0" fill="hold" nodeType="withEffect">
-                                  <p:stCondLst>
-                                    <p:cond delay="0"/>
-                                  </p:stCondLst>
-                                  <p:childTnLst>
-                                    <p:set>
-                                      <p:cBhvr>
-                                        <p:cTn id="22" dur="1" fill="hold">
                                           <p:stCondLst>
                                             <p:cond delay="0"/>
                                           </p:stCondLst>
@@ -28898,7 +28997,19 @@
             </a:pPr>
             <a:r>
               <a:rPr lang="en-US" sz="3200" dirty="0" err="1"/>
-              <a:t>Осигуравя</a:t>
+              <a:t>Осигур</a:t>
+            </a:r>
+            <a:r>
+              <a:rPr lang="bg-BG" sz="3200" dirty="0"/>
+              <a:t>я</a:t>
+            </a:r>
+            <a:r>
+              <a:rPr lang="en-US" sz="3200" dirty="0" err="1"/>
+              <a:t>в</a:t>
+            </a:r>
+            <a:r>
+              <a:rPr lang="bg-BG" sz="3200" dirty="0"/>
+              <a:t>а</a:t>
             </a:r>
             <a:r>
               <a:rPr lang="en-US" sz="3200" dirty="0"/>
@@ -28942,7 +29053,7 @@
                   <a:schemeClr val="bg1"/>
                 </a:solidFill>
               </a:rPr>
-              <a:t>вмъкване</a:t>
+              <a:t>премахване</a:t>
             </a:r>
             <a:r>
               <a:rPr lang="en-US" sz="3200" dirty="0"/>
@@ -28954,31 +29065,11 @@
                   <a:schemeClr val="bg1"/>
                 </a:solidFill>
               </a:rPr>
-              <a:t>премахване</a:t>
+              <a:t>намиране</a:t>
             </a:r>
             <a:r>
               <a:rPr lang="en-US" sz="3200" dirty="0"/>
-              <a:t> / </a:t>
-            </a:r>
-            <a:r>
-              <a:rPr lang="en-US" sz="3200" b="1" dirty="0" err="1">
-                <a:solidFill>
-                  <a:schemeClr val="bg1"/>
-                </a:solidFill>
-              </a:rPr>
-              <a:t>намиране</a:t>
-            </a:r>
-            <a:r>
-              <a:rPr lang="en-US" sz="3200" dirty="0"/>
-              <a:t>  </a:t>
-            </a:r>
-            <a:r>
-              <a:rPr lang="en-US" sz="3200" dirty="0" err="1"/>
-              <a:t>на</a:t>
-            </a:r>
-            <a:r>
-              <a:rPr lang="en-US" sz="3200" dirty="0"/>
-              <a:t> </a:t>
+              <a:t>  на </a:t>
             </a:r>
             <a:r>
               <a:rPr lang="en-US" sz="3200" dirty="0" err="1"/>

</xml_diff>